<commit_message>
to send it to 3rd dept
</commit_message>
<xml_diff>
--- a/metaX_UI_예시_1차발송본.pptx
+++ b/metaX_UI_예시_1차발송본.pptx
@@ -5,11 +5,15 @@
     <p:sldMasterId id="2147483660" r:id="rId1"/>
   </p:sldMasterIdLst>
   <p:notesMasterIdLst>
-    <p:notesMasterId r:id="rId4"/>
+    <p:notesMasterId r:id="rId8"/>
   </p:notesMasterIdLst>
   <p:sldIdLst>
-    <p:sldId id="256" r:id="rId2"/>
-    <p:sldId id="257" r:id="rId3"/>
+    <p:sldId id="258" r:id="rId2"/>
+    <p:sldId id="256" r:id="rId3"/>
+    <p:sldId id="257" r:id="rId4"/>
+    <p:sldId id="259" r:id="rId5"/>
+    <p:sldId id="260" r:id="rId6"/>
+    <p:sldId id="261" r:id="rId7"/>
   </p:sldIdLst>
   <p:sldSz cx="9144000" cy="6858000" type="screen4x3"/>
   <p:notesSz cx="6858000" cy="9144000"/>
@@ -542,7 +546,7 @@
           <a:p>
             <a:fld id="{141D52DF-E1C5-4108-8832-76122DF9DC1A}" type="slidenum">
               <a:rPr lang="ko-KR" altLang="en-US" smtClean="0"/>
-              <a:t>2</a:t>
+              <a:t>3</a:t>
             </a:fld>
             <a:endParaRPr lang="ko-KR" altLang="en-US"/>
           </a:p>
@@ -3422,6 +3426,312 @@
       </p:grpSpPr>
       <p:sp>
         <p:nvSpPr>
+          <p:cNvPr id="3" name="내용 개체 틀 2"/>
+          <p:cNvSpPr>
+            <a:spLocks noGrp="1"/>
+          </p:cNvSpPr>
+          <p:nvPr>
+            <p:ph idx="1"/>
+          </p:nvPr>
+        </p:nvSpPr>
+        <p:spPr/>
+        <p:txBody>
+          <a:bodyPr/>
+          <a:lstStyle/>
+          <a:p>
+            <a:r>
+              <a:rPr lang="ko-KR" altLang="en-US" sz="2000" dirty="0" err="1" smtClean="0">
+                <a:latin typeface="나눔바른고딕 Light" panose="020B0603020101020101" pitchFamily="50" charset="-127"/>
+                <a:ea typeface="나눔바른고딕 Light" panose="020B0603020101020101" pitchFamily="50" charset="-127"/>
+              </a:rPr>
+              <a:t>미리보기</a:t>
+            </a:r>
+            <a:r>
+              <a:rPr lang="ko-KR" altLang="en-US" sz="2000" dirty="0" smtClean="0">
+                <a:latin typeface="나눔바른고딕 Light" panose="020B0603020101020101" pitchFamily="50" charset="-127"/>
+                <a:ea typeface="나눔바른고딕 Light" panose="020B0603020101020101" pitchFamily="50" charset="-127"/>
+              </a:rPr>
+              <a:t> </a:t>
+            </a:r>
+            <a:r>
+              <a:rPr lang="en-US" altLang="ko-KR" sz="2000" dirty="0" smtClean="0">
+                <a:latin typeface="나눔바른고딕 Light" panose="020B0603020101020101" pitchFamily="50" charset="-127"/>
+                <a:ea typeface="나눔바른고딕 Light" panose="020B0603020101020101" pitchFamily="50" charset="-127"/>
+              </a:rPr>
+              <a:t>(preview</a:t>
+            </a:r>
+            <a:r>
+              <a:rPr lang="en-US" altLang="ko-KR" sz="2000" dirty="0" smtClean="0">
+                <a:latin typeface="나눔바른고딕 Light" panose="020B0603020101020101" pitchFamily="50" charset="-127"/>
+                <a:ea typeface="나눔바른고딕 Light" panose="020B0603020101020101" pitchFamily="50" charset="-127"/>
+              </a:rPr>
+              <a:t>)</a:t>
+            </a:r>
+          </a:p>
+          <a:p>
+            <a:pPr lvl="1"/>
+            <a:r>
+              <a:rPr lang="en-US" altLang="ko-KR" sz="1400" dirty="0" smtClean="0">
+                <a:latin typeface="나눔바른고딕 Light" panose="020B0603020101020101" pitchFamily="50" charset="-127"/>
+                <a:ea typeface="나눔바른고딕 Light" panose="020B0603020101020101" pitchFamily="50" charset="-127"/>
+              </a:rPr>
+              <a:t>Meta Learning</a:t>
+            </a:r>
+            <a:r>
+              <a:rPr lang="ko-KR" altLang="en-US" sz="1400" dirty="0">
+                <a:latin typeface="나눔바른고딕 Light" panose="020B0603020101020101" pitchFamily="50" charset="-127"/>
+                <a:ea typeface="나눔바른고딕 Light" panose="020B0603020101020101" pitchFamily="50" charset="-127"/>
+              </a:rPr>
+              <a:t> </a:t>
+            </a:r>
+            <a:r>
+              <a:rPr lang="ko-KR" altLang="en-US" sz="1400" dirty="0" smtClean="0">
+                <a:latin typeface="나눔바른고딕 Light" panose="020B0603020101020101" pitchFamily="50" charset="-127"/>
+                <a:ea typeface="나눔바른고딕 Light" panose="020B0603020101020101" pitchFamily="50" charset="-127"/>
+              </a:rPr>
+              <a:t>벤치마크 </a:t>
+            </a:r>
+            <a:r>
+              <a:rPr lang="ko-KR" altLang="en-US" sz="1400" dirty="0" err="1" smtClean="0">
+                <a:latin typeface="나눔바른고딕 Light" panose="020B0603020101020101" pitchFamily="50" charset="-127"/>
+                <a:ea typeface="나눔바른고딕 Light" panose="020B0603020101020101" pitchFamily="50" charset="-127"/>
+              </a:rPr>
+              <a:t>데이터셋</a:t>
+            </a:r>
+            <a:r>
+              <a:rPr lang="ko-KR" altLang="en-US" sz="1400" dirty="0" smtClean="0">
+                <a:latin typeface="나눔바른고딕 Light" panose="020B0603020101020101" pitchFamily="50" charset="-127"/>
+                <a:ea typeface="나눔바른고딕 Light" panose="020B0603020101020101" pitchFamily="50" charset="-127"/>
+              </a:rPr>
+              <a:t> </a:t>
+            </a:r>
+            <a:r>
+              <a:rPr lang="en-US" altLang="ko-KR" sz="1400" dirty="0" err="1" smtClean="0">
+                <a:latin typeface="나눔바른고딕 Light" panose="020B0603020101020101" pitchFamily="50" charset="-127"/>
+                <a:ea typeface="나눔바른고딕 Light" panose="020B0603020101020101" pitchFamily="50" charset="-127"/>
+              </a:rPr>
+              <a:t>omniglot</a:t>
+            </a:r>
+            <a:r>
+              <a:rPr lang="en-US" altLang="ko-KR" sz="1400" dirty="0" smtClean="0">
+                <a:latin typeface="나눔바른고딕 Light" panose="020B0603020101020101" pitchFamily="50" charset="-127"/>
+                <a:ea typeface="나눔바른고딕 Light" panose="020B0603020101020101" pitchFamily="50" charset="-127"/>
+              </a:rPr>
+              <a:t>, mini-</a:t>
+            </a:r>
+            <a:r>
+              <a:rPr lang="en-US" altLang="ko-KR" sz="1400" dirty="0" err="1" smtClean="0">
+                <a:latin typeface="나눔바른고딕 Light" panose="020B0603020101020101" pitchFamily="50" charset="-127"/>
+                <a:ea typeface="나눔바른고딕 Light" panose="020B0603020101020101" pitchFamily="50" charset="-127"/>
+              </a:rPr>
+              <a:t>imagenet</a:t>
+            </a:r>
+            <a:r>
+              <a:rPr lang="en-US" altLang="ko-KR" sz="1400" dirty="0">
+                <a:latin typeface="나눔바른고딕 Light" panose="020B0603020101020101" pitchFamily="50" charset="-127"/>
+                <a:ea typeface="나눔바른고딕 Light" panose="020B0603020101020101" pitchFamily="50" charset="-127"/>
+              </a:rPr>
+              <a:t> </a:t>
+            </a:r>
+            <a:r>
+              <a:rPr lang="ko-KR" altLang="en-US" sz="1400" dirty="0" smtClean="0">
+                <a:latin typeface="나눔바른고딕 Light" panose="020B0603020101020101" pitchFamily="50" charset="-127"/>
+                <a:ea typeface="나눔바른고딕 Light" panose="020B0603020101020101" pitchFamily="50" charset="-127"/>
+              </a:rPr>
+              <a:t>중 선택</a:t>
+            </a:r>
+            <a:endParaRPr lang="en-US" altLang="ko-KR" sz="1400" dirty="0" smtClean="0">
+              <a:latin typeface="나눔바른고딕 Light" panose="020B0603020101020101" pitchFamily="50" charset="-127"/>
+              <a:ea typeface="나눔바른고딕 Light" panose="020B0603020101020101" pitchFamily="50" charset="-127"/>
+            </a:endParaRPr>
+          </a:p>
+          <a:p>
+            <a:pPr lvl="1"/>
+            <a:r>
+              <a:rPr lang="ko-KR" altLang="en-US" sz="1400" dirty="0" smtClean="0">
+                <a:latin typeface="나눔바른고딕 Light" panose="020B0603020101020101" pitchFamily="50" charset="-127"/>
+                <a:ea typeface="나눔바른고딕 Light" panose="020B0603020101020101" pitchFamily="50" charset="-127"/>
+              </a:rPr>
+              <a:t>이미지 파일 확인</a:t>
+            </a:r>
+            <a:endParaRPr lang="en-US" altLang="ko-KR" sz="1400" dirty="0">
+              <a:latin typeface="나눔바른고딕 Light" panose="020B0603020101020101" pitchFamily="50" charset="-127"/>
+              <a:ea typeface="나눔바른고딕 Light" panose="020B0603020101020101" pitchFamily="50" charset="-127"/>
+            </a:endParaRPr>
+          </a:p>
+          <a:p>
+            <a:pPr lvl="1"/>
+            <a:endParaRPr lang="en-US" altLang="ko-KR" sz="1400" dirty="0" smtClean="0">
+              <a:latin typeface="나눔바른고딕 Light" panose="020B0603020101020101" pitchFamily="50" charset="-127"/>
+              <a:ea typeface="나눔바른고딕 Light" panose="020B0603020101020101" pitchFamily="50" charset="-127"/>
+            </a:endParaRPr>
+          </a:p>
+          <a:p>
+            <a:r>
+              <a:rPr lang="ko-KR" altLang="en-US" sz="2000" dirty="0" smtClean="0">
+                <a:latin typeface="나눔바른고딕 Light" panose="020B0603020101020101" pitchFamily="50" charset="-127"/>
+                <a:ea typeface="나눔바른고딕 Light" panose="020B0603020101020101" pitchFamily="50" charset="-127"/>
+              </a:rPr>
+              <a:t>데이터 전처리 </a:t>
+            </a:r>
+            <a:r>
+              <a:rPr lang="en-US" altLang="ko-KR" sz="2000" dirty="0" smtClean="0">
+                <a:latin typeface="나눔바른고딕 Light" panose="020B0603020101020101" pitchFamily="50" charset="-127"/>
+                <a:ea typeface="나눔바른고딕 Light" panose="020B0603020101020101" pitchFamily="50" charset="-127"/>
+              </a:rPr>
+              <a:t>(preprocessing</a:t>
+            </a:r>
+            <a:r>
+              <a:rPr lang="en-US" altLang="ko-KR" sz="2000" dirty="0" smtClean="0">
+                <a:latin typeface="나눔바른고딕 Light" panose="020B0603020101020101" pitchFamily="50" charset="-127"/>
+                <a:ea typeface="나눔바른고딕 Light" panose="020B0603020101020101" pitchFamily="50" charset="-127"/>
+              </a:rPr>
+              <a:t>)</a:t>
+            </a:r>
+          </a:p>
+          <a:p>
+            <a:pPr lvl="1"/>
+            <a:r>
+              <a:rPr lang="en-US" altLang="ko-KR" sz="1400" dirty="0" smtClean="0">
+                <a:latin typeface="나눔바른고딕 Light" panose="020B0603020101020101" pitchFamily="50" charset="-127"/>
+                <a:ea typeface="나눔바른고딕 Light" panose="020B0603020101020101" pitchFamily="50" charset="-127"/>
+              </a:rPr>
+              <a:t>Meat Learning </a:t>
+            </a:r>
+            <a:r>
+              <a:rPr lang="ko-KR" altLang="en-US" sz="1400" dirty="0" smtClean="0">
+                <a:latin typeface="나눔바른고딕 Light" panose="020B0603020101020101" pitchFamily="50" charset="-127"/>
+                <a:ea typeface="나눔바른고딕 Light" panose="020B0603020101020101" pitchFamily="50" charset="-127"/>
+              </a:rPr>
+              <a:t>학습 세팅을 위한 </a:t>
+            </a:r>
+            <a:r>
+              <a:rPr lang="en-US" altLang="ko-KR" sz="1400" dirty="0" smtClean="0">
+                <a:latin typeface="나눔바른고딕 Light" panose="020B0603020101020101" pitchFamily="50" charset="-127"/>
+                <a:ea typeface="나눔바른고딕 Light" panose="020B0603020101020101" pitchFamily="50" charset="-127"/>
+              </a:rPr>
+              <a:t>N-way K-Shot Task Sampling</a:t>
+            </a:r>
+            <a:endParaRPr lang="en-US" altLang="ko-KR" sz="1400" dirty="0">
+              <a:latin typeface="나눔바른고딕 Light" panose="020B0603020101020101" pitchFamily="50" charset="-127"/>
+              <a:ea typeface="나눔바른고딕 Light" panose="020B0603020101020101" pitchFamily="50" charset="-127"/>
+            </a:endParaRPr>
+          </a:p>
+          <a:p>
+            <a:pPr lvl="1"/>
+            <a:r>
+              <a:rPr lang="en-US" altLang="ko-KR" sz="1400" dirty="0" smtClean="0">
+                <a:latin typeface="나눔바른고딕 Light" panose="020B0603020101020101" pitchFamily="50" charset="-127"/>
+                <a:ea typeface="나눔바른고딕 Light" panose="020B0603020101020101" pitchFamily="50" charset="-127"/>
+              </a:rPr>
+              <a:t>Sampling</a:t>
+            </a:r>
+            <a:r>
+              <a:rPr lang="ko-KR" altLang="en-US" sz="1400" dirty="0" smtClean="0">
+                <a:latin typeface="나눔바른고딕 Light" panose="020B0603020101020101" pitchFamily="50" charset="-127"/>
+                <a:ea typeface="나눔바른고딕 Light" panose="020B0603020101020101" pitchFamily="50" charset="-127"/>
+              </a:rPr>
+              <a:t>된 </a:t>
+            </a:r>
+            <a:r>
+              <a:rPr lang="en-US" altLang="ko-KR" sz="1400" dirty="0" smtClean="0">
+                <a:latin typeface="나눔바른고딕 Light" panose="020B0603020101020101" pitchFamily="50" charset="-127"/>
+                <a:ea typeface="나눔바른고딕 Light" panose="020B0603020101020101" pitchFamily="50" charset="-127"/>
+              </a:rPr>
+              <a:t>Task </a:t>
+            </a:r>
+            <a:r>
+              <a:rPr lang="ko-KR" altLang="en-US" sz="1400" dirty="0" smtClean="0">
+                <a:latin typeface="나눔바른고딕 Light" panose="020B0603020101020101" pitchFamily="50" charset="-127"/>
+                <a:ea typeface="나눔바른고딕 Light" panose="020B0603020101020101" pitchFamily="50" charset="-127"/>
+              </a:rPr>
+              <a:t>확인</a:t>
+            </a:r>
+            <a:endParaRPr lang="en-US" altLang="ko-KR" sz="1400" dirty="0">
+              <a:latin typeface="나눔바른고딕 Light" panose="020B0603020101020101" pitchFamily="50" charset="-127"/>
+              <a:ea typeface="나눔바른고딕 Light" panose="020B0603020101020101" pitchFamily="50" charset="-127"/>
+            </a:endParaRPr>
+          </a:p>
+          <a:p>
+            <a:pPr lvl="1"/>
+            <a:endParaRPr lang="en-US" altLang="ko-KR" sz="1400" dirty="0" smtClean="0">
+              <a:latin typeface="나눔바른고딕 Light" panose="020B0603020101020101" pitchFamily="50" charset="-127"/>
+              <a:ea typeface="나눔바른고딕 Light" panose="020B0603020101020101" pitchFamily="50" charset="-127"/>
+            </a:endParaRPr>
+          </a:p>
+        </p:txBody>
+      </p:sp>
+      <p:sp>
+        <p:nvSpPr>
+          <p:cNvPr id="4" name="제목 1"/>
+          <p:cNvSpPr>
+            <a:spLocks noGrp="1"/>
+          </p:cNvSpPr>
+          <p:nvPr>
+            <p:ph type="title"/>
+          </p:nvPr>
+        </p:nvSpPr>
+        <p:spPr>
+          <a:xfrm>
+            <a:off x="628650" y="365126"/>
+            <a:ext cx="7886700" cy="634999"/>
+          </a:xfrm>
+        </p:spPr>
+        <p:txBody>
+          <a:bodyPr>
+            <a:normAutofit/>
+          </a:bodyPr>
+          <a:lstStyle/>
+          <a:p>
+            <a:r>
+              <a:rPr lang="en-US" altLang="ko-KR" sz="3200" dirty="0">
+                <a:latin typeface="나눔바른고딕" panose="020B0603020101020101" pitchFamily="50" charset="-127"/>
+                <a:ea typeface="나눔바른고딕" panose="020B0603020101020101" pitchFamily="50" charset="-127"/>
+              </a:rPr>
+              <a:t>UI </a:t>
+            </a:r>
+            <a:r>
+              <a:rPr lang="ko-KR" altLang="en-US" sz="3200" dirty="0">
+                <a:latin typeface="나눔바른고딕" panose="020B0603020101020101" pitchFamily="50" charset="-127"/>
+                <a:ea typeface="나눔바른고딕" panose="020B0603020101020101" pitchFamily="50" charset="-127"/>
+              </a:rPr>
+              <a:t>구성 예시</a:t>
+            </a:r>
+          </a:p>
+        </p:txBody>
+      </p:sp>
+    </p:spTree>
+    <p:extLst>
+      <p:ext uri="{BB962C8B-B14F-4D97-AF65-F5344CB8AC3E}">
+        <p14:creationId xmlns:p14="http://schemas.microsoft.com/office/powerpoint/2010/main" val="1782779606"/>
+      </p:ext>
+    </p:extLst>
+  </p:cSld>
+  <p:clrMapOvr>
+    <a:masterClrMapping/>
+  </p:clrMapOvr>
+</p:sld>
+</file>
+
+<file path=ppt/slides/slide2.xml><?xml version="1.0" encoding="utf-8"?>
+<p:sld xmlns:a="http://schemas.openxmlformats.org/drawingml/2006/main" xmlns:r="http://schemas.openxmlformats.org/officeDocument/2006/relationships" xmlns:p="http://schemas.openxmlformats.org/presentationml/2006/main">
+  <p:cSld>
+    <p:spTree>
+      <p:nvGrpSpPr>
+        <p:cNvPr id="1" name=""/>
+        <p:cNvGrpSpPr/>
+        <p:nvPr/>
+      </p:nvGrpSpPr>
+      <p:grpSpPr>
+        <a:xfrm>
+          <a:off x="0" y="0"/>
+          <a:ext cx="0" cy="0"/>
+          <a:chOff x="0" y="0"/>
+          <a:chExt cx="0" cy="0"/>
+        </a:xfrm>
+      </p:grpSpPr>
+      <p:sp>
+        <p:nvSpPr>
           <p:cNvPr id="2" name="제목 1"/>
           <p:cNvSpPr>
             <a:spLocks noGrp="1"/>
@@ -3448,14 +3758,7 @@
                 <a:latin typeface="나눔스퀘어" panose="020B0600000101010101" pitchFamily="50" charset="-127"/>
                 <a:ea typeface="나눔스퀘어" panose="020B0600000101010101" pitchFamily="50" charset="-127"/>
               </a:rPr>
-              <a:t>1. </a:t>
-            </a:r>
-            <a:r>
-              <a:rPr lang="en-US" altLang="ko-KR" sz="2800" dirty="0" smtClean="0">
-                <a:latin typeface="나눔스퀘어" panose="020B0600000101010101" pitchFamily="50" charset="-127"/>
-                <a:ea typeface="나눔스퀘어" panose="020B0600000101010101" pitchFamily="50" charset="-127"/>
-              </a:rPr>
-              <a:t>Preview</a:t>
+              <a:t>1. Preview</a:t>
             </a:r>
             <a:endParaRPr lang="ko-KR" altLang="en-US" sz="2800" dirty="0">
               <a:latin typeface="나눔스퀘어" panose="020B0600000101010101" pitchFamily="50" charset="-127"/>
@@ -3482,7 +3785,7 @@
             <a:fld id="{13C990A7-D049-4301-8B88-F956647A1F50}" type="slidenum">
               <a:rPr lang="ko-KR" altLang="en-US" smtClean="0"/>
               <a:pPr/>
-              <a:t>1</a:t>
+              <a:t>2</a:t>
             </a:fld>
             <a:endParaRPr lang="ko-KR" altLang="en-US" dirty="0"/>
           </a:p>
@@ -3532,7 +3835,7 @@
 </p:sld>
 </file>
 
-<file path=ppt/slides/slide2.xml><?xml version="1.0" encoding="utf-8"?>
+<file path=ppt/slides/slide3.xml><?xml version="1.0" encoding="utf-8"?>
 <p:sld xmlns:a="http://schemas.openxmlformats.org/drawingml/2006/main" xmlns:r="http://schemas.openxmlformats.org/officeDocument/2006/relationships" xmlns:p="http://schemas.openxmlformats.org/presentationml/2006/main">
   <p:cSld>
     <p:spTree>
@@ -3567,7 +3870,7 @@
             <a:fld id="{13C990A7-D049-4301-8B88-F956647A1F50}" type="slidenum">
               <a:rPr lang="ko-KR" altLang="en-US" smtClean="0"/>
               <a:pPr/>
-              <a:t>2</a:t>
+              <a:t>3</a:t>
             </a:fld>
             <a:endParaRPr lang="ko-KR" altLang="en-US" dirty="0"/>
           </a:p>
@@ -3625,14 +3928,102 @@
                 <a:latin typeface="나눔스퀘어" panose="020B0600000101010101" pitchFamily="50" charset="-127"/>
                 <a:ea typeface="나눔스퀘어" panose="020B0600000101010101" pitchFamily="50" charset="-127"/>
               </a:rPr>
-              <a:t>2. </a:t>
-            </a:r>
+              <a:t>2. Preprocessing</a:t>
+            </a:r>
+            <a:endParaRPr lang="ko-KR" altLang="en-US" sz="2800" dirty="0">
+              <a:latin typeface="나눔스퀘어" panose="020B0600000101010101" pitchFamily="50" charset="-127"/>
+              <a:ea typeface="나눔스퀘어" panose="020B0600000101010101" pitchFamily="50" charset="-127"/>
+            </a:endParaRPr>
+          </a:p>
+        </p:txBody>
+      </p:sp>
+    </p:spTree>
+    <p:extLst>
+      <p:ext uri="{BB962C8B-B14F-4D97-AF65-F5344CB8AC3E}">
+        <p14:creationId xmlns:p14="http://schemas.microsoft.com/office/powerpoint/2010/main" val="2579789"/>
+      </p:ext>
+    </p:extLst>
+  </p:cSld>
+  <p:clrMapOvr>
+    <a:masterClrMapping/>
+  </p:clrMapOvr>
+  <p:timing>
+    <p:tnLst>
+      <p:par>
+        <p:cTn id="1" dur="indefinite" restart="never" nodeType="tmRoot"/>
+      </p:par>
+    </p:tnLst>
+  </p:timing>
+</p:sld>
+</file>
+
+<file path=ppt/slides/slide4.xml><?xml version="1.0" encoding="utf-8"?>
+<p:sld xmlns:a="http://schemas.openxmlformats.org/drawingml/2006/main" xmlns:r="http://schemas.openxmlformats.org/officeDocument/2006/relationships" xmlns:p="http://schemas.openxmlformats.org/presentationml/2006/main">
+  <p:cSld>
+    <p:spTree>
+      <p:nvGrpSpPr>
+        <p:cNvPr id="1" name=""/>
+        <p:cNvGrpSpPr/>
+        <p:nvPr/>
+      </p:nvGrpSpPr>
+      <p:grpSpPr>
+        <a:xfrm>
+          <a:off x="0" y="0"/>
+          <a:ext cx="0" cy="0"/>
+          <a:chOff x="0" y="0"/>
+          <a:chExt cx="0" cy="0"/>
+        </a:xfrm>
+      </p:grpSpPr>
+      <p:sp>
+        <p:nvSpPr>
+          <p:cNvPr id="2" name="제목 1"/>
+          <p:cNvSpPr>
+            <a:spLocks noGrp="1"/>
+          </p:cNvSpPr>
+          <p:nvPr>
+            <p:ph type="title"/>
+          </p:nvPr>
+        </p:nvSpPr>
+        <p:spPr>
+          <a:xfrm>
+            <a:off x="628650" y="365127"/>
+            <a:ext cx="7886700" cy="531540"/>
+          </a:xfrm>
+        </p:spPr>
+        <p:txBody>
+          <a:bodyPr>
+            <a:normAutofit/>
+          </a:bodyPr>
+          <a:lstStyle/>
+          <a:p>
+            <a:pPr algn="l"/>
             <a:r>
               <a:rPr lang="en-US" altLang="ko-KR" sz="2800" dirty="0" smtClean="0">
                 <a:latin typeface="나눔스퀘어" panose="020B0600000101010101" pitchFamily="50" charset="-127"/>
                 <a:ea typeface="나눔스퀘어" panose="020B0600000101010101" pitchFamily="50" charset="-127"/>
               </a:rPr>
-              <a:t>Preprocessing</a:t>
+              <a:t>Step1-2 </a:t>
+            </a:r>
+            <a:r>
+              <a:rPr lang="ko-KR" altLang="en-US" sz="2800" dirty="0" err="1" smtClean="0">
+                <a:latin typeface="나눔스퀘어" panose="020B0600000101010101" pitchFamily="50" charset="-127"/>
+                <a:ea typeface="나눔스퀘어" panose="020B0600000101010101" pitchFamily="50" charset="-127"/>
+              </a:rPr>
+              <a:t>실행화면</a:t>
+            </a:r>
+            <a:r>
+              <a:rPr lang="en-US" altLang="ko-KR" sz="2800" dirty="0" smtClean="0">
+                <a:latin typeface="나눔스퀘어" panose="020B0600000101010101" pitchFamily="50" charset="-127"/>
+                <a:ea typeface="나눔스퀘어" panose="020B0600000101010101" pitchFamily="50" charset="-127"/>
+              </a:rPr>
+              <a:t>-</a:t>
+            </a:r>
+            <a:r>
+              <a:rPr lang="en-US" altLang="ko-KR" sz="2800" dirty="0" err="1" smtClean="0">
+                <a:latin typeface="나눔스퀘어" panose="020B0600000101010101" pitchFamily="50" charset="-127"/>
+                <a:ea typeface="나눔스퀘어" panose="020B0600000101010101" pitchFamily="50" charset="-127"/>
+              </a:rPr>
+              <a:t>omniglot</a:t>
             </a:r>
             <a:endParaRPr lang="ko-KR" altLang="en-US" sz="2800" dirty="0">
               <a:latin typeface="나눔스퀘어" panose="020B0600000101010101" pitchFamily="50" charset="-127"/>
@@ -3641,10 +4032,424 @@
           </a:p>
         </p:txBody>
       </p:sp>
+      <p:sp>
+        <p:nvSpPr>
+          <p:cNvPr id="4" name="슬라이드 번호 개체 틀 3"/>
+          <p:cNvSpPr>
+            <a:spLocks noGrp="1"/>
+          </p:cNvSpPr>
+          <p:nvPr>
+            <p:ph type="sldNum" sz="quarter" idx="12"/>
+          </p:nvPr>
+        </p:nvSpPr>
+        <p:spPr/>
+        <p:txBody>
+          <a:bodyPr/>
+          <a:lstStyle/>
+          <a:p>
+            <a:fld id="{13C990A7-D049-4301-8B88-F956647A1F50}" type="slidenum">
+              <a:rPr lang="ko-KR" altLang="en-US" smtClean="0"/>
+              <a:pPr/>
+              <a:t>4</a:t>
+            </a:fld>
+            <a:endParaRPr lang="ko-KR" altLang="en-US" dirty="0"/>
+          </a:p>
+        </p:txBody>
+      </p:sp>
+      <p:pic>
+        <p:nvPicPr>
+          <p:cNvPr id="5" name="그림 4"/>
+          <p:cNvPicPr>
+            <a:picLocks noChangeAspect="1"/>
+          </p:cNvPicPr>
+          <p:nvPr/>
+        </p:nvPicPr>
+        <p:blipFill>
+          <a:blip r:embed="rId2">
+            <a:extLst>
+              <a:ext uri="{28A0092B-C50C-407E-A947-70E740481C1C}">
+                <a14:useLocalDpi xmlns:a14="http://schemas.microsoft.com/office/drawing/2010/main" val="0"/>
+              </a:ext>
+            </a:extLst>
+          </a:blip>
+          <a:stretch>
+            <a:fillRect/>
+          </a:stretch>
+        </p:blipFill>
+        <p:spPr>
+          <a:xfrm>
+            <a:off x="967686" y="1283084"/>
+            <a:ext cx="6922188" cy="5337672"/>
+          </a:xfrm>
+          <a:prstGeom prst="rect">
+            <a:avLst/>
+          </a:prstGeom>
+        </p:spPr>
+      </p:pic>
     </p:spTree>
     <p:extLst>
       <p:ext uri="{BB962C8B-B14F-4D97-AF65-F5344CB8AC3E}">
-        <p14:creationId xmlns:p14="http://schemas.microsoft.com/office/powerpoint/2010/main" val="2579789"/>
+        <p14:creationId xmlns:p14="http://schemas.microsoft.com/office/powerpoint/2010/main" val="3319811354"/>
+      </p:ext>
+    </p:extLst>
+  </p:cSld>
+  <p:clrMapOvr>
+    <a:masterClrMapping/>
+  </p:clrMapOvr>
+  <p:timing>
+    <p:tnLst>
+      <p:par>
+        <p:cTn id="1" dur="indefinite" restart="never" nodeType="tmRoot"/>
+      </p:par>
+    </p:tnLst>
+  </p:timing>
+</p:sld>
+</file>
+
+<file path=ppt/slides/slide5.xml><?xml version="1.0" encoding="utf-8"?>
+<p:sld xmlns:a="http://schemas.openxmlformats.org/drawingml/2006/main" xmlns:r="http://schemas.openxmlformats.org/officeDocument/2006/relationships" xmlns:p="http://schemas.openxmlformats.org/presentationml/2006/main">
+  <p:cSld>
+    <p:spTree>
+      <p:nvGrpSpPr>
+        <p:cNvPr id="1" name=""/>
+        <p:cNvGrpSpPr/>
+        <p:nvPr/>
+      </p:nvGrpSpPr>
+      <p:grpSpPr>
+        <a:xfrm>
+          <a:off x="0" y="0"/>
+          <a:ext cx="0" cy="0"/>
+          <a:chOff x="0" y="0"/>
+          <a:chExt cx="0" cy="0"/>
+        </a:xfrm>
+      </p:grpSpPr>
+      <p:sp>
+        <p:nvSpPr>
+          <p:cNvPr id="2" name="제목 1"/>
+          <p:cNvSpPr>
+            <a:spLocks noGrp="1"/>
+          </p:cNvSpPr>
+          <p:nvPr>
+            <p:ph type="title"/>
+          </p:nvPr>
+        </p:nvSpPr>
+        <p:spPr>
+          <a:xfrm>
+            <a:off x="628650" y="365127"/>
+            <a:ext cx="7886700" cy="531540"/>
+          </a:xfrm>
+        </p:spPr>
+        <p:txBody>
+          <a:bodyPr>
+            <a:normAutofit/>
+          </a:bodyPr>
+          <a:lstStyle/>
+          <a:p>
+            <a:pPr algn="l"/>
+            <a:r>
+              <a:rPr lang="en-US" altLang="ko-KR" sz="2800" dirty="0" smtClean="0">
+                <a:latin typeface="나눔스퀘어" panose="020B0600000101010101" pitchFamily="50" charset="-127"/>
+                <a:ea typeface="나눔스퀘어" panose="020B0600000101010101" pitchFamily="50" charset="-127"/>
+              </a:rPr>
+              <a:t>Step1-2 </a:t>
+            </a:r>
+            <a:r>
+              <a:rPr lang="ko-KR" altLang="en-US" sz="2800" dirty="0" err="1" smtClean="0">
+                <a:latin typeface="나눔스퀘어" panose="020B0600000101010101" pitchFamily="50" charset="-127"/>
+                <a:ea typeface="나눔스퀘어" panose="020B0600000101010101" pitchFamily="50" charset="-127"/>
+              </a:rPr>
+              <a:t>실행화면</a:t>
+            </a:r>
+            <a:r>
+              <a:rPr lang="en-US" altLang="ko-KR" sz="2800" dirty="0" smtClean="0">
+                <a:latin typeface="나눔스퀘어" panose="020B0600000101010101" pitchFamily="50" charset="-127"/>
+                <a:ea typeface="나눔스퀘어" panose="020B0600000101010101" pitchFamily="50" charset="-127"/>
+              </a:rPr>
+              <a:t>-mini-</a:t>
+            </a:r>
+            <a:r>
+              <a:rPr lang="en-US" altLang="ko-KR" sz="2800" dirty="0" err="1" smtClean="0">
+                <a:latin typeface="나눔스퀘어" panose="020B0600000101010101" pitchFamily="50" charset="-127"/>
+                <a:ea typeface="나눔스퀘어" panose="020B0600000101010101" pitchFamily="50" charset="-127"/>
+              </a:rPr>
+              <a:t>imagenet</a:t>
+            </a:r>
+            <a:endParaRPr lang="ko-KR" altLang="en-US" sz="2800" dirty="0">
+              <a:latin typeface="나눔스퀘어" panose="020B0600000101010101" pitchFamily="50" charset="-127"/>
+              <a:ea typeface="나눔스퀘어" panose="020B0600000101010101" pitchFamily="50" charset="-127"/>
+            </a:endParaRPr>
+          </a:p>
+        </p:txBody>
+      </p:sp>
+      <p:sp>
+        <p:nvSpPr>
+          <p:cNvPr id="4" name="슬라이드 번호 개체 틀 3"/>
+          <p:cNvSpPr>
+            <a:spLocks noGrp="1"/>
+          </p:cNvSpPr>
+          <p:nvPr>
+            <p:ph type="sldNum" sz="quarter" idx="12"/>
+          </p:nvPr>
+        </p:nvSpPr>
+        <p:spPr/>
+        <p:txBody>
+          <a:bodyPr/>
+          <a:lstStyle/>
+          <a:p>
+            <a:fld id="{13C990A7-D049-4301-8B88-F956647A1F50}" type="slidenum">
+              <a:rPr lang="ko-KR" altLang="en-US" smtClean="0"/>
+              <a:pPr/>
+              <a:t>5</a:t>
+            </a:fld>
+            <a:endParaRPr lang="ko-KR" altLang="en-US" dirty="0"/>
+          </a:p>
+        </p:txBody>
+      </p:sp>
+      <p:pic>
+        <p:nvPicPr>
+          <p:cNvPr id="3" name="그림 2"/>
+          <p:cNvPicPr>
+            <a:picLocks noChangeAspect="1"/>
+          </p:cNvPicPr>
+          <p:nvPr/>
+        </p:nvPicPr>
+        <p:blipFill>
+          <a:blip r:embed="rId2">
+            <a:extLst>
+              <a:ext uri="{28A0092B-C50C-407E-A947-70E740481C1C}">
+                <a14:useLocalDpi xmlns:a14="http://schemas.microsoft.com/office/drawing/2010/main" val="0"/>
+              </a:ext>
+            </a:extLst>
+          </a:blip>
+          <a:stretch>
+            <a:fillRect/>
+          </a:stretch>
+        </p:blipFill>
+        <p:spPr>
+          <a:xfrm>
+            <a:off x="977554" y="1290693"/>
+            <a:ext cx="7284060" cy="5314322"/>
+          </a:xfrm>
+          <a:prstGeom prst="rect">
+            <a:avLst/>
+          </a:prstGeom>
+        </p:spPr>
+      </p:pic>
+    </p:spTree>
+    <p:extLst>
+      <p:ext uri="{BB962C8B-B14F-4D97-AF65-F5344CB8AC3E}">
+        <p14:creationId xmlns:p14="http://schemas.microsoft.com/office/powerpoint/2010/main" val="518164628"/>
+      </p:ext>
+    </p:extLst>
+  </p:cSld>
+  <p:clrMapOvr>
+    <a:masterClrMapping/>
+  </p:clrMapOvr>
+  <p:timing>
+    <p:tnLst>
+      <p:par>
+        <p:cTn id="1" dur="indefinite" restart="never" nodeType="tmRoot"/>
+      </p:par>
+    </p:tnLst>
+  </p:timing>
+</p:sld>
+</file>
+
+<file path=ppt/slides/slide6.xml><?xml version="1.0" encoding="utf-8"?>
+<p:sld xmlns:a="http://schemas.openxmlformats.org/drawingml/2006/main" xmlns:r="http://schemas.openxmlformats.org/officeDocument/2006/relationships" xmlns:p="http://schemas.openxmlformats.org/presentationml/2006/main">
+  <p:cSld>
+    <p:spTree>
+      <p:nvGrpSpPr>
+        <p:cNvPr id="1" name=""/>
+        <p:cNvGrpSpPr/>
+        <p:nvPr/>
+      </p:nvGrpSpPr>
+      <p:grpSpPr>
+        <a:xfrm>
+          <a:off x="0" y="0"/>
+          <a:ext cx="0" cy="0"/>
+          <a:chOff x="0" y="0"/>
+          <a:chExt cx="0" cy="0"/>
+        </a:xfrm>
+      </p:grpSpPr>
+      <p:sp>
+        <p:nvSpPr>
+          <p:cNvPr id="2" name="제목 1"/>
+          <p:cNvSpPr>
+            <a:spLocks noGrp="1"/>
+          </p:cNvSpPr>
+          <p:nvPr>
+            <p:ph type="title"/>
+          </p:nvPr>
+        </p:nvSpPr>
+        <p:spPr>
+          <a:xfrm>
+            <a:off x="628650" y="365127"/>
+            <a:ext cx="7886700" cy="531540"/>
+          </a:xfrm>
+        </p:spPr>
+        <p:txBody>
+          <a:bodyPr>
+            <a:normAutofit/>
+          </a:bodyPr>
+          <a:lstStyle/>
+          <a:p>
+            <a:pPr algn="l"/>
+            <a:r>
+              <a:rPr lang="en-US" altLang="ko-KR" sz="2800" dirty="0" smtClean="0">
+                <a:latin typeface="나눔스퀘어" panose="020B0600000101010101" pitchFamily="50" charset="-127"/>
+                <a:ea typeface="나눔스퀘어" panose="020B0600000101010101" pitchFamily="50" charset="-127"/>
+              </a:rPr>
+              <a:t>Step1-2 </a:t>
+            </a:r>
+            <a:r>
+              <a:rPr lang="ko-KR" altLang="en-US" sz="2800" dirty="0" smtClean="0">
+                <a:latin typeface="나눔스퀘어" panose="020B0600000101010101" pitchFamily="50" charset="-127"/>
+                <a:ea typeface="나눔스퀘어" panose="020B0600000101010101" pitchFamily="50" charset="-127"/>
+              </a:rPr>
+              <a:t>실행결과 생성된 파일</a:t>
+            </a:r>
+            <a:endParaRPr lang="ko-KR" altLang="en-US" sz="2800" dirty="0">
+              <a:latin typeface="나눔스퀘어" panose="020B0600000101010101" pitchFamily="50" charset="-127"/>
+              <a:ea typeface="나눔스퀘어" panose="020B0600000101010101" pitchFamily="50" charset="-127"/>
+            </a:endParaRPr>
+          </a:p>
+        </p:txBody>
+      </p:sp>
+      <p:sp>
+        <p:nvSpPr>
+          <p:cNvPr id="4" name="슬라이드 번호 개체 틀 3"/>
+          <p:cNvSpPr>
+            <a:spLocks noGrp="1"/>
+          </p:cNvSpPr>
+          <p:nvPr>
+            <p:ph type="sldNum" sz="quarter" idx="12"/>
+          </p:nvPr>
+        </p:nvSpPr>
+        <p:spPr/>
+        <p:txBody>
+          <a:bodyPr/>
+          <a:lstStyle/>
+          <a:p>
+            <a:fld id="{13C990A7-D049-4301-8B88-F956647A1F50}" type="slidenum">
+              <a:rPr lang="ko-KR" altLang="en-US" smtClean="0"/>
+              <a:pPr/>
+              <a:t>6</a:t>
+            </a:fld>
+            <a:endParaRPr lang="ko-KR" altLang="en-US" dirty="0"/>
+          </a:p>
+        </p:txBody>
+      </p:sp>
+      <p:pic>
+        <p:nvPicPr>
+          <p:cNvPr id="5" name="그림 4"/>
+          <p:cNvPicPr>
+            <a:picLocks noChangeAspect="1"/>
+          </p:cNvPicPr>
+          <p:nvPr/>
+        </p:nvPicPr>
+        <p:blipFill>
+          <a:blip r:embed="rId2">
+            <a:extLst>
+              <a:ext uri="{28A0092B-C50C-407E-A947-70E740481C1C}">
+                <a14:useLocalDpi xmlns:a14="http://schemas.microsoft.com/office/drawing/2010/main" val="0"/>
+              </a:ext>
+            </a:extLst>
+          </a:blip>
+          <a:stretch>
+            <a:fillRect/>
+          </a:stretch>
+        </p:blipFill>
+        <p:spPr>
+          <a:xfrm>
+            <a:off x="6099876" y="896667"/>
+            <a:ext cx="1842158" cy="5668178"/>
+          </a:xfrm>
+          <a:prstGeom prst="rect">
+            <a:avLst/>
+          </a:prstGeom>
+        </p:spPr>
+      </p:pic>
+      <p:sp>
+        <p:nvSpPr>
+          <p:cNvPr id="6" name="내용 개체 틀 2"/>
+          <p:cNvSpPr>
+            <a:spLocks noGrp="1"/>
+          </p:cNvSpPr>
+          <p:nvPr>
+            <p:ph idx="1"/>
+          </p:nvPr>
+        </p:nvSpPr>
+        <p:spPr>
+          <a:xfrm>
+            <a:off x="628650" y="1825625"/>
+            <a:ext cx="7886700" cy="4351338"/>
+          </a:xfrm>
+        </p:spPr>
+        <p:txBody>
+          <a:bodyPr/>
+          <a:lstStyle/>
+          <a:p>
+            <a:r>
+              <a:rPr lang="ko-KR" altLang="en-US" sz="2000" dirty="0" err="1" smtClean="0">
+                <a:latin typeface="나눔바른고딕 Light" panose="020B0603020101020101" pitchFamily="50" charset="-127"/>
+                <a:ea typeface="나눔바른고딕 Light" panose="020B0603020101020101" pitchFamily="50" charset="-127"/>
+              </a:rPr>
+              <a:t>요청포맷</a:t>
+            </a:r>
+            <a:r>
+              <a:rPr lang="en-US" altLang="ko-KR" sz="2000" dirty="0" smtClean="0">
+                <a:latin typeface="나눔바른고딕 Light" panose="020B0603020101020101" pitchFamily="50" charset="-127"/>
+                <a:ea typeface="나눔바른고딕 Light" panose="020B0603020101020101" pitchFamily="50" charset="-127"/>
+              </a:rPr>
+              <a:t>_1</a:t>
+            </a:r>
+            <a:r>
+              <a:rPr lang="ko-KR" altLang="en-US" sz="2000" dirty="0" err="1" smtClean="0">
+                <a:latin typeface="나눔바른고딕 Light" panose="020B0603020101020101" pitchFamily="50" charset="-127"/>
+                <a:ea typeface="나눔바른고딕 Light" panose="020B0603020101020101" pitchFamily="50" charset="-127"/>
+              </a:rPr>
+              <a:t>차발송본</a:t>
+            </a:r>
+            <a:r>
+              <a:rPr lang="en-US" altLang="ko-KR" sz="2000" dirty="0" smtClean="0">
+                <a:latin typeface="나눔바른고딕 Light" panose="020B0603020101020101" pitchFamily="50" charset="-127"/>
+                <a:ea typeface="나눔바른고딕 Light" panose="020B0603020101020101" pitchFamily="50" charset="-127"/>
+              </a:rPr>
+              <a:t>.</a:t>
+            </a:r>
+            <a:r>
+              <a:rPr lang="en-US" altLang="ko-KR" sz="2000" dirty="0" err="1" smtClean="0">
+                <a:latin typeface="나눔바른고딕 Light" panose="020B0603020101020101" pitchFamily="50" charset="-127"/>
+                <a:ea typeface="나눔바른고딕 Light" panose="020B0603020101020101" pitchFamily="50" charset="-127"/>
+              </a:rPr>
+              <a:t>xlsx</a:t>
+            </a:r>
+            <a:r>
+              <a:rPr lang="en-US" altLang="ko-KR" sz="2000" dirty="0" smtClean="0">
+                <a:latin typeface="나눔바른고딕 Light" panose="020B0603020101020101" pitchFamily="50" charset="-127"/>
+                <a:ea typeface="나눔바른고딕 Light" panose="020B0603020101020101" pitchFamily="50" charset="-127"/>
+              </a:rPr>
+              <a:t> </a:t>
+            </a:r>
+            <a:r>
+              <a:rPr lang="ko-KR" altLang="en-US" sz="2000" dirty="0" smtClean="0">
+                <a:latin typeface="나눔바른고딕 Light" panose="020B0603020101020101" pitchFamily="50" charset="-127"/>
+                <a:ea typeface="나눔바른고딕 Light" panose="020B0603020101020101" pitchFamily="50" charset="-127"/>
+              </a:rPr>
+              <a:t>참고</a:t>
+            </a:r>
+            <a:endParaRPr lang="en-US" altLang="ko-KR" sz="1400" dirty="0" smtClean="0">
+              <a:latin typeface="나눔바른고딕 Light" panose="020B0603020101020101" pitchFamily="50" charset="-127"/>
+              <a:ea typeface="나눔바른고딕 Light" panose="020B0603020101020101" pitchFamily="50" charset="-127"/>
+            </a:endParaRPr>
+          </a:p>
+        </p:txBody>
+      </p:sp>
+    </p:spTree>
+    <p:extLst>
+      <p:ext uri="{BB962C8B-B14F-4D97-AF65-F5344CB8AC3E}">
+        <p14:creationId xmlns:p14="http://schemas.microsoft.com/office/powerpoint/2010/main" val="3437259941"/>
       </p:ext>
     </p:extLst>
   </p:cSld>

</xml_diff>

<commit_message>
change pptx file and add package list
</commit_message>
<xml_diff>
--- a/metaX_UI_예시_1차발송본.pptx
+++ b/metaX_UI_예시_1차발송본.pptx
@@ -5,11 +5,15 @@
     <p:sldMasterId id="2147483660" r:id="rId1"/>
   </p:sldMasterIdLst>
   <p:notesMasterIdLst>
-    <p:notesMasterId r:id="rId4"/>
+    <p:notesMasterId r:id="rId8"/>
   </p:notesMasterIdLst>
   <p:sldIdLst>
-    <p:sldId id="256" r:id="rId2"/>
-    <p:sldId id="257" r:id="rId3"/>
+    <p:sldId id="258" r:id="rId2"/>
+    <p:sldId id="256" r:id="rId3"/>
+    <p:sldId id="257" r:id="rId4"/>
+    <p:sldId id="259" r:id="rId5"/>
+    <p:sldId id="260" r:id="rId6"/>
+    <p:sldId id="261" r:id="rId7"/>
   </p:sldIdLst>
   <p:sldSz cx="9144000" cy="6858000" type="screen4x3"/>
   <p:notesSz cx="6858000" cy="9144000"/>
@@ -209,7 +213,7 @@
           <a:p>
             <a:fld id="{CB5A5F2C-8847-43A3-A81A-8C6B229F13F6}" type="datetimeFigureOut">
               <a:rPr lang="ko-KR" altLang="en-US" smtClean="0"/>
-              <a:t>2020-10-15</a:t>
+              <a:t>2020-10-16</a:t>
             </a:fld>
             <a:endParaRPr lang="ko-KR" altLang="en-US"/>
           </a:p>
@@ -542,7 +546,7 @@
           <a:p>
             <a:fld id="{141D52DF-E1C5-4108-8832-76122DF9DC1A}" type="slidenum">
               <a:rPr lang="ko-KR" altLang="en-US" smtClean="0"/>
-              <a:t>2</a:t>
+              <a:t>3</a:t>
             </a:fld>
             <a:endParaRPr lang="ko-KR" altLang="en-US"/>
           </a:p>
@@ -692,7 +696,7 @@
           <a:p>
             <a:fld id="{F5000782-209F-4F09-8E33-E95593FCF97D}" type="datetimeFigureOut">
               <a:rPr lang="ko-KR" altLang="en-US" smtClean="0"/>
-              <a:t>2020-10-15</a:t>
+              <a:t>2020-10-16</a:t>
             </a:fld>
             <a:endParaRPr lang="ko-KR" altLang="en-US"/>
           </a:p>
@@ -862,7 +866,7 @@
           <a:p>
             <a:fld id="{F5000782-209F-4F09-8E33-E95593FCF97D}" type="datetimeFigureOut">
               <a:rPr lang="ko-KR" altLang="en-US" smtClean="0"/>
-              <a:t>2020-10-15</a:t>
+              <a:t>2020-10-16</a:t>
             </a:fld>
             <a:endParaRPr lang="ko-KR" altLang="en-US"/>
           </a:p>
@@ -1042,7 +1046,7 @@
           <a:p>
             <a:fld id="{F5000782-209F-4F09-8E33-E95593FCF97D}" type="datetimeFigureOut">
               <a:rPr lang="ko-KR" altLang="en-US" smtClean="0"/>
-              <a:t>2020-10-15</a:t>
+              <a:t>2020-10-16</a:t>
             </a:fld>
             <a:endParaRPr lang="ko-KR" altLang="en-US"/>
           </a:p>
@@ -1212,7 +1216,7 @@
           <a:p>
             <a:fld id="{F5000782-209F-4F09-8E33-E95593FCF97D}" type="datetimeFigureOut">
               <a:rPr lang="ko-KR" altLang="en-US" smtClean="0"/>
-              <a:t>2020-10-15</a:t>
+              <a:t>2020-10-16</a:t>
             </a:fld>
             <a:endParaRPr lang="ko-KR" altLang="en-US"/>
           </a:p>
@@ -1456,7 +1460,7 @@
           <a:p>
             <a:fld id="{F5000782-209F-4F09-8E33-E95593FCF97D}" type="datetimeFigureOut">
               <a:rPr lang="ko-KR" altLang="en-US" smtClean="0"/>
-              <a:t>2020-10-15</a:t>
+              <a:t>2020-10-16</a:t>
             </a:fld>
             <a:endParaRPr lang="ko-KR" altLang="en-US"/>
           </a:p>
@@ -1688,7 +1692,7 @@
           <a:p>
             <a:fld id="{F5000782-209F-4F09-8E33-E95593FCF97D}" type="datetimeFigureOut">
               <a:rPr lang="ko-KR" altLang="en-US" smtClean="0"/>
-              <a:t>2020-10-15</a:t>
+              <a:t>2020-10-16</a:t>
             </a:fld>
             <a:endParaRPr lang="ko-KR" altLang="en-US"/>
           </a:p>
@@ -2055,7 +2059,7 @@
           <a:p>
             <a:fld id="{F5000782-209F-4F09-8E33-E95593FCF97D}" type="datetimeFigureOut">
               <a:rPr lang="ko-KR" altLang="en-US" smtClean="0"/>
-              <a:t>2020-10-15</a:t>
+              <a:t>2020-10-16</a:t>
             </a:fld>
             <a:endParaRPr lang="ko-KR" altLang="en-US"/>
           </a:p>
@@ -2173,7 +2177,7 @@
           <a:p>
             <a:fld id="{F5000782-209F-4F09-8E33-E95593FCF97D}" type="datetimeFigureOut">
               <a:rPr lang="ko-KR" altLang="en-US" smtClean="0"/>
-              <a:t>2020-10-15</a:t>
+              <a:t>2020-10-16</a:t>
             </a:fld>
             <a:endParaRPr lang="ko-KR" altLang="en-US"/>
           </a:p>
@@ -2268,7 +2272,7 @@
           <a:p>
             <a:fld id="{F5000782-209F-4F09-8E33-E95593FCF97D}" type="datetimeFigureOut">
               <a:rPr lang="ko-KR" altLang="en-US" smtClean="0"/>
-              <a:t>2020-10-15</a:t>
+              <a:t>2020-10-16</a:t>
             </a:fld>
             <a:endParaRPr lang="ko-KR" altLang="en-US"/>
           </a:p>
@@ -2545,7 +2549,7 @@
           <a:p>
             <a:fld id="{F5000782-209F-4F09-8E33-E95593FCF97D}" type="datetimeFigureOut">
               <a:rPr lang="ko-KR" altLang="en-US" smtClean="0"/>
-              <a:t>2020-10-15</a:t>
+              <a:t>2020-10-16</a:t>
             </a:fld>
             <a:endParaRPr lang="ko-KR" altLang="en-US"/>
           </a:p>
@@ -2802,7 +2806,7 @@
           <a:p>
             <a:fld id="{F5000782-209F-4F09-8E33-E95593FCF97D}" type="datetimeFigureOut">
               <a:rPr lang="ko-KR" altLang="en-US" smtClean="0"/>
-              <a:t>2020-10-15</a:t>
+              <a:t>2020-10-16</a:t>
             </a:fld>
             <a:endParaRPr lang="ko-KR" altLang="en-US"/>
           </a:p>
@@ -3015,7 +3019,7 @@
           <a:p>
             <a:fld id="{F5000782-209F-4F09-8E33-E95593FCF97D}" type="datetimeFigureOut">
               <a:rPr lang="ko-KR" altLang="en-US" smtClean="0"/>
-              <a:t>2020-10-15</a:t>
+              <a:t>2020-10-16</a:t>
             </a:fld>
             <a:endParaRPr lang="ko-KR" altLang="en-US"/>
           </a:p>
@@ -3422,6 +3426,298 @@
       </p:grpSpPr>
       <p:sp>
         <p:nvSpPr>
+          <p:cNvPr id="3" name="내용 개체 틀 2"/>
+          <p:cNvSpPr>
+            <a:spLocks noGrp="1"/>
+          </p:cNvSpPr>
+          <p:nvPr>
+            <p:ph idx="1"/>
+          </p:nvPr>
+        </p:nvSpPr>
+        <p:spPr/>
+        <p:txBody>
+          <a:bodyPr/>
+          <a:lstStyle/>
+          <a:p>
+            <a:r>
+              <a:rPr lang="ko-KR" altLang="en-US" sz="2000" dirty="0" err="1" smtClean="0">
+                <a:latin typeface="나눔바른고딕 Light" panose="020B0603020101020101" pitchFamily="50" charset="-127"/>
+                <a:ea typeface="나눔바른고딕 Light" panose="020B0603020101020101" pitchFamily="50" charset="-127"/>
+              </a:rPr>
+              <a:t>미리보기</a:t>
+            </a:r>
+            <a:r>
+              <a:rPr lang="ko-KR" altLang="en-US" sz="2000" dirty="0" smtClean="0">
+                <a:latin typeface="나눔바른고딕 Light" panose="020B0603020101020101" pitchFamily="50" charset="-127"/>
+                <a:ea typeface="나눔바른고딕 Light" panose="020B0603020101020101" pitchFamily="50" charset="-127"/>
+              </a:rPr>
+              <a:t> </a:t>
+            </a:r>
+            <a:r>
+              <a:rPr lang="en-US" altLang="ko-KR" sz="2000" dirty="0" smtClean="0">
+                <a:latin typeface="나눔바른고딕 Light" panose="020B0603020101020101" pitchFamily="50" charset="-127"/>
+                <a:ea typeface="나눔바른고딕 Light" panose="020B0603020101020101" pitchFamily="50" charset="-127"/>
+              </a:rPr>
+              <a:t>(preview)</a:t>
+            </a:r>
+          </a:p>
+          <a:p>
+            <a:pPr lvl="1"/>
+            <a:r>
+              <a:rPr lang="en-US" altLang="ko-KR" sz="1400" dirty="0" smtClean="0">
+                <a:latin typeface="나눔바른고딕 Light" panose="020B0603020101020101" pitchFamily="50" charset="-127"/>
+                <a:ea typeface="나눔바른고딕 Light" panose="020B0603020101020101" pitchFamily="50" charset="-127"/>
+              </a:rPr>
+              <a:t>Meta Learning</a:t>
+            </a:r>
+            <a:r>
+              <a:rPr lang="ko-KR" altLang="en-US" sz="1400" dirty="0">
+                <a:latin typeface="나눔바른고딕 Light" panose="020B0603020101020101" pitchFamily="50" charset="-127"/>
+                <a:ea typeface="나눔바른고딕 Light" panose="020B0603020101020101" pitchFamily="50" charset="-127"/>
+              </a:rPr>
+              <a:t> </a:t>
+            </a:r>
+            <a:r>
+              <a:rPr lang="ko-KR" altLang="en-US" sz="1400" dirty="0" smtClean="0">
+                <a:latin typeface="나눔바른고딕 Light" panose="020B0603020101020101" pitchFamily="50" charset="-127"/>
+                <a:ea typeface="나눔바른고딕 Light" panose="020B0603020101020101" pitchFamily="50" charset="-127"/>
+              </a:rPr>
+              <a:t>벤치마크 </a:t>
+            </a:r>
+            <a:r>
+              <a:rPr lang="ko-KR" altLang="en-US" sz="1400" dirty="0" err="1" smtClean="0">
+                <a:latin typeface="나눔바른고딕 Light" panose="020B0603020101020101" pitchFamily="50" charset="-127"/>
+                <a:ea typeface="나눔바른고딕 Light" panose="020B0603020101020101" pitchFamily="50" charset="-127"/>
+              </a:rPr>
+              <a:t>데이터셋</a:t>
+            </a:r>
+            <a:r>
+              <a:rPr lang="ko-KR" altLang="en-US" sz="1400" dirty="0" smtClean="0">
+                <a:latin typeface="나눔바른고딕 Light" panose="020B0603020101020101" pitchFamily="50" charset="-127"/>
+                <a:ea typeface="나눔바른고딕 Light" panose="020B0603020101020101" pitchFamily="50" charset="-127"/>
+              </a:rPr>
+              <a:t> </a:t>
+            </a:r>
+            <a:r>
+              <a:rPr lang="en-US" altLang="ko-KR" sz="1400" dirty="0" err="1" smtClean="0">
+                <a:latin typeface="나눔바른고딕 Light" panose="020B0603020101020101" pitchFamily="50" charset="-127"/>
+                <a:ea typeface="나눔바른고딕 Light" panose="020B0603020101020101" pitchFamily="50" charset="-127"/>
+              </a:rPr>
+              <a:t>omniglot</a:t>
+            </a:r>
+            <a:r>
+              <a:rPr lang="en-US" altLang="ko-KR" sz="1400" dirty="0" smtClean="0">
+                <a:latin typeface="나눔바른고딕 Light" panose="020B0603020101020101" pitchFamily="50" charset="-127"/>
+                <a:ea typeface="나눔바른고딕 Light" panose="020B0603020101020101" pitchFamily="50" charset="-127"/>
+              </a:rPr>
+              <a:t>, mini-</a:t>
+            </a:r>
+            <a:r>
+              <a:rPr lang="en-US" altLang="ko-KR" sz="1400" dirty="0" err="1" smtClean="0">
+                <a:latin typeface="나눔바른고딕 Light" panose="020B0603020101020101" pitchFamily="50" charset="-127"/>
+                <a:ea typeface="나눔바른고딕 Light" panose="020B0603020101020101" pitchFamily="50" charset="-127"/>
+              </a:rPr>
+              <a:t>imagenet</a:t>
+            </a:r>
+            <a:r>
+              <a:rPr lang="en-US" altLang="ko-KR" sz="1400" dirty="0">
+                <a:latin typeface="나눔바른고딕 Light" panose="020B0603020101020101" pitchFamily="50" charset="-127"/>
+                <a:ea typeface="나눔바른고딕 Light" panose="020B0603020101020101" pitchFamily="50" charset="-127"/>
+              </a:rPr>
+              <a:t> </a:t>
+            </a:r>
+            <a:r>
+              <a:rPr lang="ko-KR" altLang="en-US" sz="1400" dirty="0" smtClean="0">
+                <a:latin typeface="나눔바른고딕 Light" panose="020B0603020101020101" pitchFamily="50" charset="-127"/>
+                <a:ea typeface="나눔바른고딕 Light" panose="020B0603020101020101" pitchFamily="50" charset="-127"/>
+              </a:rPr>
+              <a:t>중 선택</a:t>
+            </a:r>
+            <a:endParaRPr lang="en-US" altLang="ko-KR" sz="1400" dirty="0" smtClean="0">
+              <a:latin typeface="나눔바른고딕 Light" panose="020B0603020101020101" pitchFamily="50" charset="-127"/>
+              <a:ea typeface="나눔바른고딕 Light" panose="020B0603020101020101" pitchFamily="50" charset="-127"/>
+            </a:endParaRPr>
+          </a:p>
+          <a:p>
+            <a:pPr lvl="1"/>
+            <a:r>
+              <a:rPr lang="ko-KR" altLang="en-US" sz="1400" dirty="0" smtClean="0">
+                <a:latin typeface="나눔바른고딕 Light" panose="020B0603020101020101" pitchFamily="50" charset="-127"/>
+                <a:ea typeface="나눔바른고딕 Light" panose="020B0603020101020101" pitchFamily="50" charset="-127"/>
+              </a:rPr>
+              <a:t>이미지 파일 확인</a:t>
+            </a:r>
+            <a:endParaRPr lang="en-US" altLang="ko-KR" sz="1400" dirty="0">
+              <a:latin typeface="나눔바른고딕 Light" panose="020B0603020101020101" pitchFamily="50" charset="-127"/>
+              <a:ea typeface="나눔바른고딕 Light" panose="020B0603020101020101" pitchFamily="50" charset="-127"/>
+            </a:endParaRPr>
+          </a:p>
+          <a:p>
+            <a:pPr lvl="1"/>
+            <a:endParaRPr lang="en-US" altLang="ko-KR" sz="1400" dirty="0" smtClean="0">
+              <a:latin typeface="나눔바른고딕 Light" panose="020B0603020101020101" pitchFamily="50" charset="-127"/>
+              <a:ea typeface="나눔바른고딕 Light" panose="020B0603020101020101" pitchFamily="50" charset="-127"/>
+            </a:endParaRPr>
+          </a:p>
+          <a:p>
+            <a:r>
+              <a:rPr lang="ko-KR" altLang="en-US" sz="2000" dirty="0" smtClean="0">
+                <a:latin typeface="나눔바른고딕 Light" panose="020B0603020101020101" pitchFamily="50" charset="-127"/>
+                <a:ea typeface="나눔바른고딕 Light" panose="020B0603020101020101" pitchFamily="50" charset="-127"/>
+              </a:rPr>
+              <a:t>데이터 전처리 </a:t>
+            </a:r>
+            <a:r>
+              <a:rPr lang="en-US" altLang="ko-KR" sz="2000" dirty="0" smtClean="0">
+                <a:latin typeface="나눔바른고딕 Light" panose="020B0603020101020101" pitchFamily="50" charset="-127"/>
+                <a:ea typeface="나눔바른고딕 Light" panose="020B0603020101020101" pitchFamily="50" charset="-127"/>
+              </a:rPr>
+              <a:t>(preprocessing)</a:t>
+            </a:r>
+          </a:p>
+          <a:p>
+            <a:pPr lvl="1"/>
+            <a:r>
+              <a:rPr lang="en-US" altLang="ko-KR" sz="1400" dirty="0" smtClean="0">
+                <a:latin typeface="나눔바른고딕 Light" panose="020B0603020101020101" pitchFamily="50" charset="-127"/>
+                <a:ea typeface="나눔바른고딕 Light" panose="020B0603020101020101" pitchFamily="50" charset="-127"/>
+              </a:rPr>
+              <a:t>Meat Learning </a:t>
+            </a:r>
+            <a:r>
+              <a:rPr lang="ko-KR" altLang="en-US" sz="1400" dirty="0" smtClean="0">
+                <a:latin typeface="나눔바른고딕 Light" panose="020B0603020101020101" pitchFamily="50" charset="-127"/>
+                <a:ea typeface="나눔바른고딕 Light" panose="020B0603020101020101" pitchFamily="50" charset="-127"/>
+              </a:rPr>
+              <a:t>학습 세팅을 위한 </a:t>
+            </a:r>
+            <a:r>
+              <a:rPr lang="en-US" altLang="ko-KR" sz="1400" dirty="0" smtClean="0">
+                <a:latin typeface="나눔바른고딕 Light" panose="020B0603020101020101" pitchFamily="50" charset="-127"/>
+                <a:ea typeface="나눔바른고딕 Light" panose="020B0603020101020101" pitchFamily="50" charset="-127"/>
+              </a:rPr>
+              <a:t>N-way K-Shot Task Sampling</a:t>
+            </a:r>
+            <a:endParaRPr lang="en-US" altLang="ko-KR" sz="1400" dirty="0">
+              <a:latin typeface="나눔바른고딕 Light" panose="020B0603020101020101" pitchFamily="50" charset="-127"/>
+              <a:ea typeface="나눔바른고딕 Light" panose="020B0603020101020101" pitchFamily="50" charset="-127"/>
+            </a:endParaRPr>
+          </a:p>
+          <a:p>
+            <a:pPr lvl="1"/>
+            <a:r>
+              <a:rPr lang="en-US" altLang="ko-KR" sz="1400" dirty="0" smtClean="0">
+                <a:latin typeface="나눔바른고딕 Light" panose="020B0603020101020101" pitchFamily="50" charset="-127"/>
+                <a:ea typeface="나눔바른고딕 Light" panose="020B0603020101020101" pitchFamily="50" charset="-127"/>
+              </a:rPr>
+              <a:t>Sampling</a:t>
+            </a:r>
+            <a:r>
+              <a:rPr lang="ko-KR" altLang="en-US" sz="1400" dirty="0" smtClean="0">
+                <a:latin typeface="나눔바른고딕 Light" panose="020B0603020101020101" pitchFamily="50" charset="-127"/>
+                <a:ea typeface="나눔바른고딕 Light" panose="020B0603020101020101" pitchFamily="50" charset="-127"/>
+              </a:rPr>
+              <a:t>된 </a:t>
+            </a:r>
+            <a:r>
+              <a:rPr lang="en-US" altLang="ko-KR" sz="1400" dirty="0" smtClean="0">
+                <a:latin typeface="나눔바른고딕 Light" panose="020B0603020101020101" pitchFamily="50" charset="-127"/>
+                <a:ea typeface="나눔바른고딕 Light" panose="020B0603020101020101" pitchFamily="50" charset="-127"/>
+              </a:rPr>
+              <a:t>Task </a:t>
+            </a:r>
+            <a:r>
+              <a:rPr lang="ko-KR" altLang="en-US" sz="1400" dirty="0" smtClean="0">
+                <a:latin typeface="나눔바른고딕 Light" panose="020B0603020101020101" pitchFamily="50" charset="-127"/>
+                <a:ea typeface="나눔바른고딕 Light" panose="020B0603020101020101" pitchFamily="50" charset="-127"/>
+              </a:rPr>
+              <a:t>확인</a:t>
+            </a:r>
+            <a:endParaRPr lang="en-US" altLang="ko-KR" sz="1400" dirty="0">
+              <a:latin typeface="나눔바른고딕 Light" panose="020B0603020101020101" pitchFamily="50" charset="-127"/>
+              <a:ea typeface="나눔바른고딕 Light" panose="020B0603020101020101" pitchFamily="50" charset="-127"/>
+            </a:endParaRPr>
+          </a:p>
+          <a:p>
+            <a:pPr lvl="1"/>
+            <a:endParaRPr lang="en-US" altLang="ko-KR" sz="1400" dirty="0" smtClean="0">
+              <a:latin typeface="나눔바른고딕 Light" panose="020B0603020101020101" pitchFamily="50" charset="-127"/>
+              <a:ea typeface="나눔바른고딕 Light" panose="020B0603020101020101" pitchFamily="50" charset="-127"/>
+            </a:endParaRPr>
+          </a:p>
+        </p:txBody>
+      </p:sp>
+      <p:sp>
+        <p:nvSpPr>
+          <p:cNvPr id="4" name="제목 1"/>
+          <p:cNvSpPr>
+            <a:spLocks noGrp="1"/>
+          </p:cNvSpPr>
+          <p:nvPr>
+            <p:ph type="title"/>
+          </p:nvPr>
+        </p:nvSpPr>
+        <p:spPr>
+          <a:xfrm>
+            <a:off x="628650" y="365126"/>
+            <a:ext cx="7886700" cy="634999"/>
+          </a:xfrm>
+        </p:spPr>
+        <p:txBody>
+          <a:bodyPr>
+            <a:normAutofit/>
+          </a:bodyPr>
+          <a:lstStyle/>
+          <a:p>
+            <a:r>
+              <a:rPr lang="en-US" altLang="ko-KR" sz="3200" dirty="0">
+                <a:latin typeface="나눔바른고딕" panose="020B0603020101020101" pitchFamily="50" charset="-127"/>
+                <a:ea typeface="나눔바른고딕" panose="020B0603020101020101" pitchFamily="50" charset="-127"/>
+              </a:rPr>
+              <a:t>UI </a:t>
+            </a:r>
+            <a:r>
+              <a:rPr lang="ko-KR" altLang="en-US" sz="3200" dirty="0">
+                <a:latin typeface="나눔바른고딕" panose="020B0603020101020101" pitchFamily="50" charset="-127"/>
+                <a:ea typeface="나눔바른고딕" panose="020B0603020101020101" pitchFamily="50" charset="-127"/>
+              </a:rPr>
+              <a:t>구성 예시</a:t>
+            </a:r>
+          </a:p>
+        </p:txBody>
+      </p:sp>
+    </p:spTree>
+    <p:extLst>
+      <p:ext uri="{BB962C8B-B14F-4D97-AF65-F5344CB8AC3E}">
+        <p14:creationId xmlns:p14="http://schemas.microsoft.com/office/powerpoint/2010/main" val="1782779606"/>
+      </p:ext>
+    </p:extLst>
+  </p:cSld>
+  <p:clrMapOvr>
+    <a:masterClrMapping/>
+  </p:clrMapOvr>
+</p:sld>
+</file>
+
+<file path=ppt/slides/slide2.xml><?xml version="1.0" encoding="utf-8"?>
+<p:sld xmlns:a="http://schemas.openxmlformats.org/drawingml/2006/main" xmlns:r="http://schemas.openxmlformats.org/officeDocument/2006/relationships" xmlns:p="http://schemas.openxmlformats.org/presentationml/2006/main">
+  <p:cSld>
+    <p:spTree>
+      <p:nvGrpSpPr>
+        <p:cNvPr id="1" name=""/>
+        <p:cNvGrpSpPr/>
+        <p:nvPr/>
+      </p:nvGrpSpPr>
+      <p:grpSpPr>
+        <a:xfrm>
+          <a:off x="0" y="0"/>
+          <a:ext cx="0" cy="0"/>
+          <a:chOff x="0" y="0"/>
+          <a:chExt cx="0" cy="0"/>
+        </a:xfrm>
+      </p:grpSpPr>
+      <p:sp>
+        <p:nvSpPr>
           <p:cNvPr id="2" name="제목 1"/>
           <p:cNvSpPr>
             <a:spLocks noGrp="1"/>
@@ -3448,14 +3744,7 @@
                 <a:latin typeface="나눔스퀘어" panose="020B0600000101010101" pitchFamily="50" charset="-127"/>
                 <a:ea typeface="나눔스퀘어" panose="020B0600000101010101" pitchFamily="50" charset="-127"/>
               </a:rPr>
-              <a:t>1. </a:t>
-            </a:r>
-            <a:r>
-              <a:rPr lang="en-US" altLang="ko-KR" sz="2800" dirty="0" smtClean="0">
-                <a:latin typeface="나눔스퀘어" panose="020B0600000101010101" pitchFamily="50" charset="-127"/>
-                <a:ea typeface="나눔스퀘어" panose="020B0600000101010101" pitchFamily="50" charset="-127"/>
-              </a:rPr>
-              <a:t>Preview</a:t>
+              <a:t>1. Preview</a:t>
             </a:r>
             <a:endParaRPr lang="ko-KR" altLang="en-US" sz="2800" dirty="0">
               <a:latin typeface="나눔스퀘어" panose="020B0600000101010101" pitchFamily="50" charset="-127"/>
@@ -3482,7 +3771,7 @@
             <a:fld id="{13C990A7-D049-4301-8B88-F956647A1F50}" type="slidenum">
               <a:rPr lang="ko-KR" altLang="en-US" smtClean="0"/>
               <a:pPr/>
-              <a:t>1</a:t>
+              <a:t>2</a:t>
             </a:fld>
             <a:endParaRPr lang="ko-KR" altLang="en-US" dirty="0"/>
           </a:p>
@@ -3532,7 +3821,7 @@
 </p:sld>
 </file>
 
-<file path=ppt/slides/slide2.xml><?xml version="1.0" encoding="utf-8"?>
+<file path=ppt/slides/slide3.xml><?xml version="1.0" encoding="utf-8"?>
 <p:sld xmlns:a="http://schemas.openxmlformats.org/drawingml/2006/main" xmlns:r="http://schemas.openxmlformats.org/officeDocument/2006/relationships" xmlns:p="http://schemas.openxmlformats.org/presentationml/2006/main">
   <p:cSld>
     <p:spTree>
@@ -3567,7 +3856,7 @@
             <a:fld id="{13C990A7-D049-4301-8B88-F956647A1F50}" type="slidenum">
               <a:rPr lang="ko-KR" altLang="en-US" smtClean="0"/>
               <a:pPr/>
-              <a:t>2</a:t>
+              <a:t>3</a:t>
             </a:fld>
             <a:endParaRPr lang="ko-KR" altLang="en-US" dirty="0"/>
           </a:p>
@@ -3625,14 +3914,102 @@
                 <a:latin typeface="나눔스퀘어" panose="020B0600000101010101" pitchFamily="50" charset="-127"/>
                 <a:ea typeface="나눔스퀘어" panose="020B0600000101010101" pitchFamily="50" charset="-127"/>
               </a:rPr>
-              <a:t>2. </a:t>
-            </a:r>
+              <a:t>2. Preprocessing</a:t>
+            </a:r>
+            <a:endParaRPr lang="ko-KR" altLang="en-US" sz="2800" dirty="0">
+              <a:latin typeface="나눔스퀘어" panose="020B0600000101010101" pitchFamily="50" charset="-127"/>
+              <a:ea typeface="나눔스퀘어" panose="020B0600000101010101" pitchFamily="50" charset="-127"/>
+            </a:endParaRPr>
+          </a:p>
+        </p:txBody>
+      </p:sp>
+    </p:spTree>
+    <p:extLst>
+      <p:ext uri="{BB962C8B-B14F-4D97-AF65-F5344CB8AC3E}">
+        <p14:creationId xmlns:p14="http://schemas.microsoft.com/office/powerpoint/2010/main" val="2579789"/>
+      </p:ext>
+    </p:extLst>
+  </p:cSld>
+  <p:clrMapOvr>
+    <a:masterClrMapping/>
+  </p:clrMapOvr>
+  <p:timing>
+    <p:tnLst>
+      <p:par>
+        <p:cTn id="1" dur="indefinite" restart="never" nodeType="tmRoot"/>
+      </p:par>
+    </p:tnLst>
+  </p:timing>
+</p:sld>
+</file>
+
+<file path=ppt/slides/slide4.xml><?xml version="1.0" encoding="utf-8"?>
+<p:sld xmlns:a="http://schemas.openxmlformats.org/drawingml/2006/main" xmlns:r="http://schemas.openxmlformats.org/officeDocument/2006/relationships" xmlns:p="http://schemas.openxmlformats.org/presentationml/2006/main">
+  <p:cSld>
+    <p:spTree>
+      <p:nvGrpSpPr>
+        <p:cNvPr id="1" name=""/>
+        <p:cNvGrpSpPr/>
+        <p:nvPr/>
+      </p:nvGrpSpPr>
+      <p:grpSpPr>
+        <a:xfrm>
+          <a:off x="0" y="0"/>
+          <a:ext cx="0" cy="0"/>
+          <a:chOff x="0" y="0"/>
+          <a:chExt cx="0" cy="0"/>
+        </a:xfrm>
+      </p:grpSpPr>
+      <p:sp>
+        <p:nvSpPr>
+          <p:cNvPr id="2" name="제목 1"/>
+          <p:cNvSpPr>
+            <a:spLocks noGrp="1"/>
+          </p:cNvSpPr>
+          <p:nvPr>
+            <p:ph type="title"/>
+          </p:nvPr>
+        </p:nvSpPr>
+        <p:spPr>
+          <a:xfrm>
+            <a:off x="628650" y="365127"/>
+            <a:ext cx="7886700" cy="531540"/>
+          </a:xfrm>
+        </p:spPr>
+        <p:txBody>
+          <a:bodyPr>
+            <a:normAutofit/>
+          </a:bodyPr>
+          <a:lstStyle/>
+          <a:p>
+            <a:pPr algn="l"/>
             <a:r>
               <a:rPr lang="en-US" altLang="ko-KR" sz="2800" dirty="0" smtClean="0">
                 <a:latin typeface="나눔스퀘어" panose="020B0600000101010101" pitchFamily="50" charset="-127"/>
                 <a:ea typeface="나눔스퀘어" panose="020B0600000101010101" pitchFamily="50" charset="-127"/>
               </a:rPr>
-              <a:t>Preprocessing</a:t>
+              <a:t>Step1-2 </a:t>
+            </a:r>
+            <a:r>
+              <a:rPr lang="ko-KR" altLang="en-US" sz="2800" dirty="0" err="1" smtClean="0">
+                <a:latin typeface="나눔스퀘어" panose="020B0600000101010101" pitchFamily="50" charset="-127"/>
+                <a:ea typeface="나눔스퀘어" panose="020B0600000101010101" pitchFamily="50" charset="-127"/>
+              </a:rPr>
+              <a:t>실행화면</a:t>
+            </a:r>
+            <a:r>
+              <a:rPr lang="en-US" altLang="ko-KR" sz="2800" dirty="0" smtClean="0">
+                <a:latin typeface="나눔스퀘어" panose="020B0600000101010101" pitchFamily="50" charset="-127"/>
+                <a:ea typeface="나눔스퀘어" panose="020B0600000101010101" pitchFamily="50" charset="-127"/>
+              </a:rPr>
+              <a:t>-</a:t>
+            </a:r>
+            <a:r>
+              <a:rPr lang="en-US" altLang="ko-KR" sz="2800" dirty="0" err="1" smtClean="0">
+                <a:latin typeface="나눔스퀘어" panose="020B0600000101010101" pitchFamily="50" charset="-127"/>
+                <a:ea typeface="나눔스퀘어" panose="020B0600000101010101" pitchFamily="50" charset="-127"/>
+              </a:rPr>
+              <a:t>omniglot</a:t>
             </a:r>
             <a:endParaRPr lang="ko-KR" altLang="en-US" sz="2800" dirty="0">
               <a:latin typeface="나눔스퀘어" panose="020B0600000101010101" pitchFamily="50" charset="-127"/>
@@ -3641,10 +4018,424 @@
           </a:p>
         </p:txBody>
       </p:sp>
+      <p:sp>
+        <p:nvSpPr>
+          <p:cNvPr id="4" name="슬라이드 번호 개체 틀 3"/>
+          <p:cNvSpPr>
+            <a:spLocks noGrp="1"/>
+          </p:cNvSpPr>
+          <p:nvPr>
+            <p:ph type="sldNum" sz="quarter" idx="12"/>
+          </p:nvPr>
+        </p:nvSpPr>
+        <p:spPr/>
+        <p:txBody>
+          <a:bodyPr/>
+          <a:lstStyle/>
+          <a:p>
+            <a:fld id="{13C990A7-D049-4301-8B88-F956647A1F50}" type="slidenum">
+              <a:rPr lang="ko-KR" altLang="en-US" smtClean="0"/>
+              <a:pPr/>
+              <a:t>4</a:t>
+            </a:fld>
+            <a:endParaRPr lang="ko-KR" altLang="en-US" dirty="0"/>
+          </a:p>
+        </p:txBody>
+      </p:sp>
+      <p:pic>
+        <p:nvPicPr>
+          <p:cNvPr id="5" name="그림 4"/>
+          <p:cNvPicPr>
+            <a:picLocks noChangeAspect="1"/>
+          </p:cNvPicPr>
+          <p:nvPr/>
+        </p:nvPicPr>
+        <p:blipFill>
+          <a:blip r:embed="rId2">
+            <a:extLst>
+              <a:ext uri="{28A0092B-C50C-407E-A947-70E740481C1C}">
+                <a14:useLocalDpi xmlns:a14="http://schemas.microsoft.com/office/drawing/2010/main" val="0"/>
+              </a:ext>
+            </a:extLst>
+          </a:blip>
+          <a:stretch>
+            <a:fillRect/>
+          </a:stretch>
+        </p:blipFill>
+        <p:spPr>
+          <a:xfrm>
+            <a:off x="967686" y="1283084"/>
+            <a:ext cx="6922188" cy="5337672"/>
+          </a:xfrm>
+          <a:prstGeom prst="rect">
+            <a:avLst/>
+          </a:prstGeom>
+        </p:spPr>
+      </p:pic>
     </p:spTree>
     <p:extLst>
       <p:ext uri="{BB962C8B-B14F-4D97-AF65-F5344CB8AC3E}">
-        <p14:creationId xmlns:p14="http://schemas.microsoft.com/office/powerpoint/2010/main" val="2579789"/>
+        <p14:creationId xmlns:p14="http://schemas.microsoft.com/office/powerpoint/2010/main" val="3319811354"/>
+      </p:ext>
+    </p:extLst>
+  </p:cSld>
+  <p:clrMapOvr>
+    <a:masterClrMapping/>
+  </p:clrMapOvr>
+  <p:timing>
+    <p:tnLst>
+      <p:par>
+        <p:cTn id="1" dur="indefinite" restart="never" nodeType="tmRoot"/>
+      </p:par>
+    </p:tnLst>
+  </p:timing>
+</p:sld>
+</file>
+
+<file path=ppt/slides/slide5.xml><?xml version="1.0" encoding="utf-8"?>
+<p:sld xmlns:a="http://schemas.openxmlformats.org/drawingml/2006/main" xmlns:r="http://schemas.openxmlformats.org/officeDocument/2006/relationships" xmlns:p="http://schemas.openxmlformats.org/presentationml/2006/main">
+  <p:cSld>
+    <p:spTree>
+      <p:nvGrpSpPr>
+        <p:cNvPr id="1" name=""/>
+        <p:cNvGrpSpPr/>
+        <p:nvPr/>
+      </p:nvGrpSpPr>
+      <p:grpSpPr>
+        <a:xfrm>
+          <a:off x="0" y="0"/>
+          <a:ext cx="0" cy="0"/>
+          <a:chOff x="0" y="0"/>
+          <a:chExt cx="0" cy="0"/>
+        </a:xfrm>
+      </p:grpSpPr>
+      <p:sp>
+        <p:nvSpPr>
+          <p:cNvPr id="2" name="제목 1"/>
+          <p:cNvSpPr>
+            <a:spLocks noGrp="1"/>
+          </p:cNvSpPr>
+          <p:nvPr>
+            <p:ph type="title"/>
+          </p:nvPr>
+        </p:nvSpPr>
+        <p:spPr>
+          <a:xfrm>
+            <a:off x="628650" y="365127"/>
+            <a:ext cx="7886700" cy="531540"/>
+          </a:xfrm>
+        </p:spPr>
+        <p:txBody>
+          <a:bodyPr>
+            <a:normAutofit/>
+          </a:bodyPr>
+          <a:lstStyle/>
+          <a:p>
+            <a:pPr algn="l"/>
+            <a:r>
+              <a:rPr lang="en-US" altLang="ko-KR" sz="2800" dirty="0" smtClean="0">
+                <a:latin typeface="나눔스퀘어" panose="020B0600000101010101" pitchFamily="50" charset="-127"/>
+                <a:ea typeface="나눔스퀘어" panose="020B0600000101010101" pitchFamily="50" charset="-127"/>
+              </a:rPr>
+              <a:t>Step1-2 </a:t>
+            </a:r>
+            <a:r>
+              <a:rPr lang="ko-KR" altLang="en-US" sz="2800" dirty="0" err="1" smtClean="0">
+                <a:latin typeface="나눔스퀘어" panose="020B0600000101010101" pitchFamily="50" charset="-127"/>
+                <a:ea typeface="나눔스퀘어" panose="020B0600000101010101" pitchFamily="50" charset="-127"/>
+              </a:rPr>
+              <a:t>실행화면</a:t>
+            </a:r>
+            <a:r>
+              <a:rPr lang="en-US" altLang="ko-KR" sz="2800" dirty="0" smtClean="0">
+                <a:latin typeface="나눔스퀘어" panose="020B0600000101010101" pitchFamily="50" charset="-127"/>
+                <a:ea typeface="나눔스퀘어" panose="020B0600000101010101" pitchFamily="50" charset="-127"/>
+              </a:rPr>
+              <a:t>-mini-</a:t>
+            </a:r>
+            <a:r>
+              <a:rPr lang="en-US" altLang="ko-KR" sz="2800" dirty="0" err="1" smtClean="0">
+                <a:latin typeface="나눔스퀘어" panose="020B0600000101010101" pitchFamily="50" charset="-127"/>
+                <a:ea typeface="나눔스퀘어" panose="020B0600000101010101" pitchFamily="50" charset="-127"/>
+              </a:rPr>
+              <a:t>imagenet</a:t>
+            </a:r>
+            <a:endParaRPr lang="ko-KR" altLang="en-US" sz="2800" dirty="0">
+              <a:latin typeface="나눔스퀘어" panose="020B0600000101010101" pitchFamily="50" charset="-127"/>
+              <a:ea typeface="나눔스퀘어" panose="020B0600000101010101" pitchFamily="50" charset="-127"/>
+            </a:endParaRPr>
+          </a:p>
+        </p:txBody>
+      </p:sp>
+      <p:sp>
+        <p:nvSpPr>
+          <p:cNvPr id="4" name="슬라이드 번호 개체 틀 3"/>
+          <p:cNvSpPr>
+            <a:spLocks noGrp="1"/>
+          </p:cNvSpPr>
+          <p:nvPr>
+            <p:ph type="sldNum" sz="quarter" idx="12"/>
+          </p:nvPr>
+        </p:nvSpPr>
+        <p:spPr/>
+        <p:txBody>
+          <a:bodyPr/>
+          <a:lstStyle/>
+          <a:p>
+            <a:fld id="{13C990A7-D049-4301-8B88-F956647A1F50}" type="slidenum">
+              <a:rPr lang="ko-KR" altLang="en-US" smtClean="0"/>
+              <a:pPr/>
+              <a:t>5</a:t>
+            </a:fld>
+            <a:endParaRPr lang="ko-KR" altLang="en-US" dirty="0"/>
+          </a:p>
+        </p:txBody>
+      </p:sp>
+      <p:pic>
+        <p:nvPicPr>
+          <p:cNvPr id="3" name="그림 2"/>
+          <p:cNvPicPr>
+            <a:picLocks noChangeAspect="1"/>
+          </p:cNvPicPr>
+          <p:nvPr/>
+        </p:nvPicPr>
+        <p:blipFill>
+          <a:blip r:embed="rId2">
+            <a:extLst>
+              <a:ext uri="{28A0092B-C50C-407E-A947-70E740481C1C}">
+                <a14:useLocalDpi xmlns:a14="http://schemas.microsoft.com/office/drawing/2010/main" val="0"/>
+              </a:ext>
+            </a:extLst>
+          </a:blip>
+          <a:stretch>
+            <a:fillRect/>
+          </a:stretch>
+        </p:blipFill>
+        <p:spPr>
+          <a:xfrm>
+            <a:off x="977554" y="1290693"/>
+            <a:ext cx="7284060" cy="5314322"/>
+          </a:xfrm>
+          <a:prstGeom prst="rect">
+            <a:avLst/>
+          </a:prstGeom>
+        </p:spPr>
+      </p:pic>
+    </p:spTree>
+    <p:extLst>
+      <p:ext uri="{BB962C8B-B14F-4D97-AF65-F5344CB8AC3E}">
+        <p14:creationId xmlns:p14="http://schemas.microsoft.com/office/powerpoint/2010/main" val="518164628"/>
+      </p:ext>
+    </p:extLst>
+  </p:cSld>
+  <p:clrMapOvr>
+    <a:masterClrMapping/>
+  </p:clrMapOvr>
+  <p:timing>
+    <p:tnLst>
+      <p:par>
+        <p:cTn id="1" dur="indefinite" restart="never" nodeType="tmRoot"/>
+      </p:par>
+    </p:tnLst>
+  </p:timing>
+</p:sld>
+</file>
+
+<file path=ppt/slides/slide6.xml><?xml version="1.0" encoding="utf-8"?>
+<p:sld xmlns:a="http://schemas.openxmlformats.org/drawingml/2006/main" xmlns:r="http://schemas.openxmlformats.org/officeDocument/2006/relationships" xmlns:p="http://schemas.openxmlformats.org/presentationml/2006/main">
+  <p:cSld>
+    <p:spTree>
+      <p:nvGrpSpPr>
+        <p:cNvPr id="1" name=""/>
+        <p:cNvGrpSpPr/>
+        <p:nvPr/>
+      </p:nvGrpSpPr>
+      <p:grpSpPr>
+        <a:xfrm>
+          <a:off x="0" y="0"/>
+          <a:ext cx="0" cy="0"/>
+          <a:chOff x="0" y="0"/>
+          <a:chExt cx="0" cy="0"/>
+        </a:xfrm>
+      </p:grpSpPr>
+      <p:sp>
+        <p:nvSpPr>
+          <p:cNvPr id="2" name="제목 1"/>
+          <p:cNvSpPr>
+            <a:spLocks noGrp="1"/>
+          </p:cNvSpPr>
+          <p:nvPr>
+            <p:ph type="title"/>
+          </p:nvPr>
+        </p:nvSpPr>
+        <p:spPr>
+          <a:xfrm>
+            <a:off x="628650" y="365127"/>
+            <a:ext cx="7886700" cy="531540"/>
+          </a:xfrm>
+        </p:spPr>
+        <p:txBody>
+          <a:bodyPr>
+            <a:normAutofit/>
+          </a:bodyPr>
+          <a:lstStyle/>
+          <a:p>
+            <a:pPr algn="l"/>
+            <a:r>
+              <a:rPr lang="en-US" altLang="ko-KR" sz="2800" dirty="0" smtClean="0">
+                <a:latin typeface="나눔스퀘어" panose="020B0600000101010101" pitchFamily="50" charset="-127"/>
+                <a:ea typeface="나눔스퀘어" panose="020B0600000101010101" pitchFamily="50" charset="-127"/>
+              </a:rPr>
+              <a:t>Step1-2 </a:t>
+            </a:r>
+            <a:r>
+              <a:rPr lang="ko-KR" altLang="en-US" sz="2800" dirty="0" smtClean="0">
+                <a:latin typeface="나눔스퀘어" panose="020B0600000101010101" pitchFamily="50" charset="-127"/>
+                <a:ea typeface="나눔스퀘어" panose="020B0600000101010101" pitchFamily="50" charset="-127"/>
+              </a:rPr>
+              <a:t>실행결과 생성된 파일</a:t>
+            </a:r>
+            <a:endParaRPr lang="ko-KR" altLang="en-US" sz="2800" dirty="0">
+              <a:latin typeface="나눔스퀘어" panose="020B0600000101010101" pitchFamily="50" charset="-127"/>
+              <a:ea typeface="나눔스퀘어" panose="020B0600000101010101" pitchFamily="50" charset="-127"/>
+            </a:endParaRPr>
+          </a:p>
+        </p:txBody>
+      </p:sp>
+      <p:sp>
+        <p:nvSpPr>
+          <p:cNvPr id="4" name="슬라이드 번호 개체 틀 3"/>
+          <p:cNvSpPr>
+            <a:spLocks noGrp="1"/>
+          </p:cNvSpPr>
+          <p:nvPr>
+            <p:ph type="sldNum" sz="quarter" idx="12"/>
+          </p:nvPr>
+        </p:nvSpPr>
+        <p:spPr/>
+        <p:txBody>
+          <a:bodyPr/>
+          <a:lstStyle/>
+          <a:p>
+            <a:fld id="{13C990A7-D049-4301-8B88-F956647A1F50}" type="slidenum">
+              <a:rPr lang="ko-KR" altLang="en-US" smtClean="0"/>
+              <a:pPr/>
+              <a:t>6</a:t>
+            </a:fld>
+            <a:endParaRPr lang="ko-KR" altLang="en-US" dirty="0"/>
+          </a:p>
+        </p:txBody>
+      </p:sp>
+      <p:pic>
+        <p:nvPicPr>
+          <p:cNvPr id="5" name="그림 4"/>
+          <p:cNvPicPr>
+            <a:picLocks noChangeAspect="1"/>
+          </p:cNvPicPr>
+          <p:nvPr/>
+        </p:nvPicPr>
+        <p:blipFill>
+          <a:blip r:embed="rId2">
+            <a:extLst>
+              <a:ext uri="{28A0092B-C50C-407E-A947-70E740481C1C}">
+                <a14:useLocalDpi xmlns:a14="http://schemas.microsoft.com/office/drawing/2010/main" val="0"/>
+              </a:ext>
+            </a:extLst>
+          </a:blip>
+          <a:stretch>
+            <a:fillRect/>
+          </a:stretch>
+        </p:blipFill>
+        <p:spPr>
+          <a:xfrm>
+            <a:off x="6099876" y="896667"/>
+            <a:ext cx="1842158" cy="5668178"/>
+          </a:xfrm>
+          <a:prstGeom prst="rect">
+            <a:avLst/>
+          </a:prstGeom>
+        </p:spPr>
+      </p:pic>
+      <p:sp>
+        <p:nvSpPr>
+          <p:cNvPr id="6" name="내용 개체 틀 2"/>
+          <p:cNvSpPr>
+            <a:spLocks noGrp="1"/>
+          </p:cNvSpPr>
+          <p:nvPr>
+            <p:ph idx="1"/>
+          </p:nvPr>
+        </p:nvSpPr>
+        <p:spPr>
+          <a:xfrm>
+            <a:off x="628650" y="1825625"/>
+            <a:ext cx="7886700" cy="4351338"/>
+          </a:xfrm>
+        </p:spPr>
+        <p:txBody>
+          <a:bodyPr/>
+          <a:lstStyle/>
+          <a:p>
+            <a:r>
+              <a:rPr lang="ko-KR" altLang="en-US" sz="2000" dirty="0" err="1" smtClean="0">
+                <a:latin typeface="나눔바른고딕 Light" panose="020B0603020101020101" pitchFamily="50" charset="-127"/>
+                <a:ea typeface="나눔바른고딕 Light" panose="020B0603020101020101" pitchFamily="50" charset="-127"/>
+              </a:rPr>
+              <a:t>요청포맷</a:t>
+            </a:r>
+            <a:r>
+              <a:rPr lang="en-US" altLang="ko-KR" sz="2000" dirty="0" smtClean="0">
+                <a:latin typeface="나눔바른고딕 Light" panose="020B0603020101020101" pitchFamily="50" charset="-127"/>
+                <a:ea typeface="나눔바른고딕 Light" panose="020B0603020101020101" pitchFamily="50" charset="-127"/>
+              </a:rPr>
+              <a:t>_1</a:t>
+            </a:r>
+            <a:r>
+              <a:rPr lang="ko-KR" altLang="en-US" sz="2000" dirty="0" err="1" smtClean="0">
+                <a:latin typeface="나눔바른고딕 Light" panose="020B0603020101020101" pitchFamily="50" charset="-127"/>
+                <a:ea typeface="나눔바른고딕 Light" panose="020B0603020101020101" pitchFamily="50" charset="-127"/>
+              </a:rPr>
+              <a:t>차발송본</a:t>
+            </a:r>
+            <a:r>
+              <a:rPr lang="en-US" altLang="ko-KR" sz="2000" dirty="0" smtClean="0">
+                <a:latin typeface="나눔바른고딕 Light" panose="020B0603020101020101" pitchFamily="50" charset="-127"/>
+                <a:ea typeface="나눔바른고딕 Light" panose="020B0603020101020101" pitchFamily="50" charset="-127"/>
+              </a:rPr>
+              <a:t>.</a:t>
+            </a:r>
+            <a:r>
+              <a:rPr lang="en-US" altLang="ko-KR" sz="2000" dirty="0" err="1" smtClean="0">
+                <a:latin typeface="나눔바른고딕 Light" panose="020B0603020101020101" pitchFamily="50" charset="-127"/>
+                <a:ea typeface="나눔바른고딕 Light" panose="020B0603020101020101" pitchFamily="50" charset="-127"/>
+              </a:rPr>
+              <a:t>xlsx</a:t>
+            </a:r>
+            <a:r>
+              <a:rPr lang="en-US" altLang="ko-KR" sz="2000" dirty="0" smtClean="0">
+                <a:latin typeface="나눔바른고딕 Light" panose="020B0603020101020101" pitchFamily="50" charset="-127"/>
+                <a:ea typeface="나눔바른고딕 Light" panose="020B0603020101020101" pitchFamily="50" charset="-127"/>
+              </a:rPr>
+              <a:t> </a:t>
+            </a:r>
+            <a:r>
+              <a:rPr lang="ko-KR" altLang="en-US" sz="2000" dirty="0" smtClean="0">
+                <a:latin typeface="나눔바른고딕 Light" panose="020B0603020101020101" pitchFamily="50" charset="-127"/>
+                <a:ea typeface="나눔바른고딕 Light" panose="020B0603020101020101" pitchFamily="50" charset="-127"/>
+              </a:rPr>
+              <a:t>참고</a:t>
+            </a:r>
+            <a:endParaRPr lang="en-US" altLang="ko-KR" sz="1400" dirty="0" smtClean="0">
+              <a:latin typeface="나눔바른고딕 Light" panose="020B0603020101020101" pitchFamily="50" charset="-127"/>
+              <a:ea typeface="나눔바른고딕 Light" panose="020B0603020101020101" pitchFamily="50" charset="-127"/>
+            </a:endParaRPr>
+          </a:p>
+        </p:txBody>
+      </p:sp>
+    </p:spTree>
+    <p:extLst>
+      <p:ext uri="{BB962C8B-B14F-4D97-AF65-F5344CB8AC3E}">
+        <p14:creationId xmlns:p14="http://schemas.microsoft.com/office/powerpoint/2010/main" val="3437259941"/>
       </p:ext>
     </p:extLst>
   </p:cSld>

</xml_diff>